<commit_message>
Added info on Fuslogvw.exe (Assembly Binding Log Viewer)
</commit_message>
<xml_diff>
--- a/Presentation/lesson-07.pptx
+++ b/Presentation/lesson-07.pptx
@@ -5,7 +5,7 @@
     <p:sldMasterId id="2147483648" r:id="rId1"/>
   </p:sldMasterIdLst>
   <p:notesMasterIdLst>
-    <p:notesMasterId r:id="rId27"/>
+    <p:notesMasterId r:id="rId28"/>
   </p:notesMasterIdLst>
   <p:sldIdLst>
     <p:sldId id="257" r:id="rId2"/>
@@ -19,20 +19,21 @@
     <p:sldId id="280" r:id="rId10"/>
     <p:sldId id="278" r:id="rId11"/>
     <p:sldId id="279" r:id="rId12"/>
-    <p:sldId id="281" r:id="rId13"/>
-    <p:sldId id="282" r:id="rId14"/>
-    <p:sldId id="285" r:id="rId15"/>
-    <p:sldId id="286" r:id="rId16"/>
-    <p:sldId id="287" r:id="rId17"/>
-    <p:sldId id="288" r:id="rId18"/>
-    <p:sldId id="289" r:id="rId19"/>
-    <p:sldId id="284" r:id="rId20"/>
-    <p:sldId id="261" r:id="rId21"/>
-    <p:sldId id="262" r:id="rId22"/>
-    <p:sldId id="263" r:id="rId23"/>
-    <p:sldId id="264" r:id="rId24"/>
-    <p:sldId id="265" r:id="rId25"/>
-    <p:sldId id="271" r:id="rId26"/>
+    <p:sldId id="290" r:id="rId13"/>
+    <p:sldId id="281" r:id="rId14"/>
+    <p:sldId id="282" r:id="rId15"/>
+    <p:sldId id="285" r:id="rId16"/>
+    <p:sldId id="286" r:id="rId17"/>
+    <p:sldId id="287" r:id="rId18"/>
+    <p:sldId id="288" r:id="rId19"/>
+    <p:sldId id="289" r:id="rId20"/>
+    <p:sldId id="284" r:id="rId21"/>
+    <p:sldId id="261" r:id="rId22"/>
+    <p:sldId id="262" r:id="rId23"/>
+    <p:sldId id="263" r:id="rId24"/>
+    <p:sldId id="264" r:id="rId25"/>
+    <p:sldId id="265" r:id="rId26"/>
+    <p:sldId id="271" r:id="rId27"/>
   </p:sldIdLst>
   <p:sldSz cx="9144000" cy="6858000" type="screen4x3"/>
   <p:notesSz cx="6858000" cy="9144000"/>
@@ -216,7 +217,7 @@
           <a:p>
             <a:fld id="{B24A7054-7FFB-49F4-A126-5DF6E687FF53}" type="datetimeFigureOut">
               <a:rPr lang="ru-RU" smtClean="0"/>
-              <a:t>06.11.2012</a:t>
+              <a:t>10.02.2013</a:t>
             </a:fld>
             <a:endParaRPr lang="ru-RU"/>
           </a:p>
@@ -1498,7 +1499,7 @@
           <a:p>
             <a:fld id="{8E6E6A2A-E9D3-4A0D-B04A-ABDD367A1E08}" type="datetimeFigureOut">
               <a:rPr lang="ru-RU" smtClean="0"/>
-              <a:t>06.11.2012</a:t>
+              <a:t>10.02.2013</a:t>
             </a:fld>
             <a:endParaRPr lang="ru-RU"/>
           </a:p>
@@ -2943,7 +2944,7 @@
           <a:p>
             <a:fld id="{AC3D3127-B7C4-45E3-9797-C527EC9FDD78}" type="datetimeFigureOut">
               <a:rPr lang="ru-RU" smtClean="0"/>
-              <a:t>06.11.2012</a:t>
+              <a:t>10.02.2013</a:t>
             </a:fld>
             <a:endParaRPr lang="ru-RU"/>
           </a:p>
@@ -4279,16 +4280,8 @@
           <a:lstStyle/>
           <a:p>
             <a:r>
-              <a:rPr lang="ru-RU" dirty="0" smtClean="0"/>
-              <a:t>Строгое имя сборки (</a:t>
-            </a:r>
-            <a:r>
-              <a:rPr lang="en-US" dirty="0" smtClean="0"/>
-              <a:t>strong name</a:t>
-            </a:r>
-            <a:r>
-              <a:rPr lang="ru-RU" dirty="0" smtClean="0"/>
-              <a:t>)</a:t>
+              <a:rPr lang="en-US" dirty="0"/>
+              <a:t>Fuslogvw.exe (Assembly Binding Log Viewer)</a:t>
             </a:r>
             <a:endParaRPr lang="ru-RU" dirty="0"/>
           </a:p>
@@ -4307,117 +4300,99 @@
         <p:spPr/>
         <p:txBody>
           <a:bodyPr>
-            <a:normAutofit lnSpcReduction="10000"/>
+            <a:normAutofit fontScale="92500" lnSpcReduction="20000"/>
           </a:bodyPr>
           <a:lstStyle/>
           <a:p>
+            <a:pPr marL="0" indent="0">
+              <a:buNone/>
+            </a:pPr>
             <a:r>
               <a:rPr lang="ru-RU" dirty="0" smtClean="0"/>
-              <a:t>Имя</a:t>
-            </a:r>
-          </a:p>
-          <a:p>
+              <a:t>Диагностика проблем с загрузкой сборок. </a:t>
+            </a:r>
+            <a:r>
+              <a:rPr lang="ru-RU" smtClean="0"/>
+              <a:t>Является частью </a:t>
+            </a:r>
+            <a:r>
+              <a:rPr lang="en-US" dirty="0" smtClean="0"/>
+              <a:t>Windows SDK</a:t>
+            </a:r>
             <a:r>
               <a:rPr lang="ru-RU" dirty="0" smtClean="0"/>
-              <a:t>Номер версии</a:t>
-            </a:r>
-          </a:p>
-          <a:p>
+              <a:t>.</a:t>
+            </a:r>
+          </a:p>
+          <a:p>
+            <a:pPr marL="0" indent="0">
+              <a:buNone/>
+            </a:pPr>
+            <a:endParaRPr lang="ru-RU" dirty="0" smtClean="0"/>
+          </a:p>
+          <a:p>
+            <a:r>
+              <a:rPr lang="en-US" dirty="0" smtClean="0"/>
+              <a:t>HKLM\Software\Microsoft\Fusion</a:t>
+            </a:r>
+            <a:endParaRPr lang="ru-RU" dirty="0" smtClean="0"/>
+          </a:p>
+          <a:p>
+            <a:pPr lvl="1"/>
+            <a:r>
+              <a:rPr lang="en-US" dirty="0" err="1"/>
+              <a:t>ForceLog</a:t>
+            </a:r>
+            <a:r>
+              <a:rPr lang="en-US" dirty="0"/>
+              <a:t> </a:t>
+            </a:r>
             <a:r>
               <a:rPr lang="ru-RU" dirty="0" smtClean="0"/>
-              <a:t>Культура</a:t>
-            </a:r>
-          </a:p>
-          <a:p>
+              <a:t>= 1</a:t>
+            </a:r>
+          </a:p>
+          <a:p>
+            <a:pPr lvl="1"/>
             <a:r>
               <a:rPr lang="en-US" dirty="0" err="1" smtClean="0"/>
-              <a:t>PublicKeyToken</a:t>
-            </a:r>
-            <a:endParaRPr lang="en-US" dirty="0" smtClean="0"/>
-          </a:p>
-          <a:p>
-            <a:endParaRPr lang="en-US" dirty="0"/>
-          </a:p>
-          <a:p>
-            <a:r>
-              <a:rPr lang="en-US" sz="2400" dirty="0" err="1"/>
-              <a:t>MyTypes</a:t>
-            </a:r>
-            <a:r>
-              <a:rPr lang="en-US" sz="2400" dirty="0"/>
-              <a:t>, </a:t>
-            </a:r>
-            <a:r>
-              <a:rPr lang="en-US" sz="2400" dirty="0" smtClean="0"/>
-              <a:t>Version=1.0.8123.</a:t>
-            </a:r>
-            <a:r>
-              <a:rPr lang="ru-RU" sz="2400" dirty="0" smtClean="0"/>
-              <a:t>О,</a:t>
-            </a:r>
-            <a:r>
-              <a:rPr lang="en-US" sz="2400" dirty="0" smtClean="0"/>
-              <a:t/>
-            </a:r>
-            <a:br>
-              <a:rPr lang="en-US" sz="2400" dirty="0" smtClean="0"/>
-            </a:br>
-            <a:r>
-              <a:rPr lang="en-US" sz="2400" dirty="0" smtClean="0"/>
-              <a:t>Culture=neutral</a:t>
-            </a:r>
-            <a:r>
-              <a:rPr lang="en-US" sz="2400" dirty="0"/>
-              <a:t>, </a:t>
-            </a:r>
-            <a:r>
-              <a:rPr lang="en-US" sz="2400" dirty="0" err="1" smtClean="0"/>
-              <a:t>PublicKeyToken</a:t>
-            </a:r>
-            <a:r>
-              <a:rPr lang="en-US" sz="2400" dirty="0" smtClean="0"/>
-              <a:t>=b77a5c561934e089</a:t>
-            </a:r>
-          </a:p>
-          <a:p>
-            <a:r>
-              <a:rPr lang="en-US" sz="2400" dirty="0" err="1"/>
-              <a:t>MyTypes</a:t>
-            </a:r>
-            <a:r>
-              <a:rPr lang="en-US" sz="2400" dirty="0"/>
-              <a:t>, </a:t>
-            </a:r>
-            <a:r>
-              <a:rPr lang="en-US" sz="2400" dirty="0" smtClean="0"/>
-              <a:t>Version=1.0.8123.</a:t>
-            </a:r>
-            <a:r>
-              <a:rPr lang="ru-RU" sz="2400" dirty="0"/>
-              <a:t>О,</a:t>
-            </a:r>
-            <a:r>
-              <a:rPr lang="en-US" sz="2400" dirty="0"/>
-              <a:t/>
-            </a:r>
-            <a:br>
-              <a:rPr lang="en-US" sz="2400" dirty="0"/>
-            </a:br>
-            <a:r>
-              <a:rPr lang="en-US" sz="2400" dirty="0" smtClean="0"/>
-              <a:t>Culture=en-US, </a:t>
-            </a:r>
-            <a:r>
-              <a:rPr lang="en-US" sz="2400" dirty="0" err="1"/>
-              <a:t>PublicKeyToken</a:t>
-            </a:r>
-            <a:r>
-              <a:rPr lang="en-US" sz="2400" dirty="0"/>
-              <a:t>=b77a5c561934e089</a:t>
-            </a:r>
-            <a:endParaRPr lang="ru-RU" sz="2400" dirty="0" smtClean="0"/>
-          </a:p>
-          <a:p>
+              <a:t>LogPath</a:t>
+            </a:r>
+            <a:r>
+              <a:rPr lang="ru-RU" dirty="0" smtClean="0"/>
+              <a:t> – путь к существующей папке для протоколирования</a:t>
+            </a:r>
+          </a:p>
+          <a:p>
+            <a:pPr marL="0" indent="0">
+              <a:buNone/>
+            </a:pPr>
+            <a:endParaRPr lang="ru-RU" dirty="0" smtClean="0">
+              <a:hlinkClick r:id="rId2"/>
+            </a:endParaRPr>
+          </a:p>
+          <a:p>
+            <a:pPr marL="0" indent="0">
+              <a:buNone/>
+            </a:pPr>
+            <a:r>
+              <a:rPr lang="en-US" dirty="0" smtClean="0">
+                <a:hlinkClick r:id="rId2"/>
+              </a:rPr>
+              <a:t>http</a:t>
+            </a:r>
+            <a:r>
+              <a:rPr lang="en-US" dirty="0">
+                <a:hlinkClick r:id="rId2"/>
+              </a:rPr>
+              <a:t>://</a:t>
+            </a:r>
+            <a:r>
+              <a:rPr lang="en-US" dirty="0" smtClean="0">
+                <a:hlinkClick r:id="rId2"/>
+              </a:rPr>
+              <a:t>msdn.microsoft.com/en-us/library/e74a18c4%28v=vs.110%29.aspx</a:t>
+            </a:r>
             <a:endParaRPr lang="ru-RU" dirty="0"/>
           </a:p>
         </p:txBody>
@@ -4425,13 +4400,20 @@
     </p:spTree>
     <p:extLst>
       <p:ext uri="{BB962C8B-B14F-4D97-AF65-F5344CB8AC3E}">
-        <p14:creationId xmlns:p14="http://schemas.microsoft.com/office/powerpoint/2010/main" val="1579629595"/>
+        <p14:creationId xmlns:p14="http://schemas.microsoft.com/office/powerpoint/2010/main" val="3803663968"/>
       </p:ext>
     </p:extLst>
   </p:cSld>
   <p:clrMapOvr>
     <a:masterClrMapping/>
   </p:clrMapOvr>
+  <p:timing>
+    <p:tnLst>
+      <p:par>
+        <p:cTn id="1" dur="indefinite" restart="never" nodeType="tmRoot"/>
+      </p:par>
+    </p:tnLst>
+  </p:timing>
 </p:sld>
 </file>
 
@@ -4464,6 +4446,204 @@
         </p:nvSpPr>
         <p:spPr/>
         <p:txBody>
+          <a:bodyPr>
+            <a:normAutofit fontScale="90000"/>
+          </a:bodyPr>
+          <a:lstStyle/>
+          <a:p>
+            <a:r>
+              <a:rPr lang="ru-RU" dirty="0" smtClean="0"/>
+              <a:t>Строгое имя сборки (</a:t>
+            </a:r>
+            <a:r>
+              <a:rPr lang="en-US" dirty="0" smtClean="0"/>
+              <a:t>strong name</a:t>
+            </a:r>
+            <a:r>
+              <a:rPr lang="ru-RU" dirty="0" smtClean="0"/>
+              <a:t>)</a:t>
+            </a:r>
+            <a:endParaRPr lang="ru-RU" dirty="0"/>
+          </a:p>
+        </p:txBody>
+      </p:sp>
+      <p:sp>
+        <p:nvSpPr>
+          <p:cNvPr id="3" name="Content Placeholder 2"/>
+          <p:cNvSpPr>
+            <a:spLocks noGrp="1"/>
+          </p:cNvSpPr>
+          <p:nvPr>
+            <p:ph idx="1"/>
+          </p:nvPr>
+        </p:nvSpPr>
+        <p:spPr/>
+        <p:txBody>
+          <a:bodyPr>
+            <a:normAutofit lnSpcReduction="10000"/>
+          </a:bodyPr>
+          <a:lstStyle/>
+          <a:p>
+            <a:r>
+              <a:rPr lang="ru-RU" dirty="0" smtClean="0"/>
+              <a:t>Имя</a:t>
+            </a:r>
+          </a:p>
+          <a:p>
+            <a:r>
+              <a:rPr lang="ru-RU" dirty="0" smtClean="0"/>
+              <a:t>Номер версии</a:t>
+            </a:r>
+          </a:p>
+          <a:p>
+            <a:r>
+              <a:rPr lang="ru-RU" dirty="0" smtClean="0"/>
+              <a:t>Культура</a:t>
+            </a:r>
+          </a:p>
+          <a:p>
+            <a:r>
+              <a:rPr lang="en-US" dirty="0" err="1" smtClean="0"/>
+              <a:t>PublicKeyToken</a:t>
+            </a:r>
+            <a:endParaRPr lang="en-US" dirty="0" smtClean="0"/>
+          </a:p>
+          <a:p>
+            <a:endParaRPr lang="en-US" dirty="0"/>
+          </a:p>
+          <a:p>
+            <a:r>
+              <a:rPr lang="en-US" sz="2400" dirty="0" err="1"/>
+              <a:t>MyTypes</a:t>
+            </a:r>
+            <a:r>
+              <a:rPr lang="en-US" sz="2400" dirty="0"/>
+              <a:t>, </a:t>
+            </a:r>
+            <a:r>
+              <a:rPr lang="en-US" sz="2400" dirty="0" smtClean="0"/>
+              <a:t>Version=1.0.8123.</a:t>
+            </a:r>
+            <a:r>
+              <a:rPr lang="ru-RU" sz="2400" dirty="0" smtClean="0"/>
+              <a:t>О,</a:t>
+            </a:r>
+            <a:r>
+              <a:rPr lang="en-US" sz="2400" dirty="0" smtClean="0"/>
+              <a:t/>
+            </a:r>
+            <a:br>
+              <a:rPr lang="en-US" sz="2400" dirty="0" smtClean="0"/>
+            </a:br>
+            <a:r>
+              <a:rPr lang="en-US" sz="2400" dirty="0" smtClean="0"/>
+              <a:t>Culture=neutral</a:t>
+            </a:r>
+            <a:r>
+              <a:rPr lang="en-US" sz="2400" dirty="0"/>
+              <a:t>, </a:t>
+            </a:r>
+            <a:r>
+              <a:rPr lang="en-US" sz="2400" dirty="0" err="1" smtClean="0"/>
+              <a:t>PublicKeyToken</a:t>
+            </a:r>
+            <a:r>
+              <a:rPr lang="en-US" sz="2400" dirty="0" smtClean="0"/>
+              <a:t>=b77a5c561934e089</a:t>
+            </a:r>
+          </a:p>
+          <a:p>
+            <a:r>
+              <a:rPr lang="en-US" sz="2400" dirty="0" err="1"/>
+              <a:t>MyTypes</a:t>
+            </a:r>
+            <a:r>
+              <a:rPr lang="en-US" sz="2400" dirty="0"/>
+              <a:t>, </a:t>
+            </a:r>
+            <a:r>
+              <a:rPr lang="en-US" sz="2400" dirty="0" smtClean="0"/>
+              <a:t>Version=1.0.8123.</a:t>
+            </a:r>
+            <a:r>
+              <a:rPr lang="ru-RU" sz="2400" dirty="0"/>
+              <a:t>О,</a:t>
+            </a:r>
+            <a:r>
+              <a:rPr lang="en-US" sz="2400" dirty="0"/>
+              <a:t/>
+            </a:r>
+            <a:br>
+              <a:rPr lang="en-US" sz="2400" dirty="0"/>
+            </a:br>
+            <a:r>
+              <a:rPr lang="en-US" sz="2400" dirty="0" smtClean="0"/>
+              <a:t>Culture=en-US, </a:t>
+            </a:r>
+            <a:r>
+              <a:rPr lang="en-US" sz="2400" dirty="0" err="1"/>
+              <a:t>PublicKeyToken</a:t>
+            </a:r>
+            <a:r>
+              <a:rPr lang="en-US" sz="2400" dirty="0"/>
+              <a:t>=b77a5c561934e089</a:t>
+            </a:r>
+            <a:endParaRPr lang="ru-RU" sz="2400" dirty="0" smtClean="0"/>
+          </a:p>
+          <a:p>
+            <a:endParaRPr lang="ru-RU" dirty="0"/>
+          </a:p>
+        </p:txBody>
+      </p:sp>
+    </p:spTree>
+    <p:extLst>
+      <p:ext uri="{BB962C8B-B14F-4D97-AF65-F5344CB8AC3E}">
+        <p14:creationId xmlns:p14="http://schemas.microsoft.com/office/powerpoint/2010/main" val="1579629595"/>
+      </p:ext>
+    </p:extLst>
+  </p:cSld>
+  <p:clrMapOvr>
+    <a:masterClrMapping/>
+  </p:clrMapOvr>
+  <p:timing>
+    <p:tnLst>
+      <p:par>
+        <p:cTn id="1" dur="indefinite" restart="never" nodeType="tmRoot"/>
+      </p:par>
+    </p:tnLst>
+  </p:timing>
+</p:sld>
+</file>
+
+<file path=ppt/slides/slide14.xml><?xml version="1.0" encoding="utf-8"?>
+<p:sld xmlns:a="http://schemas.openxmlformats.org/drawingml/2006/main" xmlns:r="http://schemas.openxmlformats.org/officeDocument/2006/relationships" xmlns:p="http://schemas.openxmlformats.org/presentationml/2006/main">
+  <p:cSld>
+    <p:spTree>
+      <p:nvGrpSpPr>
+        <p:cNvPr id="1" name=""/>
+        <p:cNvGrpSpPr/>
+        <p:nvPr/>
+      </p:nvGrpSpPr>
+      <p:grpSpPr>
+        <a:xfrm>
+          <a:off x="0" y="0"/>
+          <a:ext cx="0" cy="0"/>
+          <a:chOff x="0" y="0"/>
+          <a:chExt cx="0" cy="0"/>
+        </a:xfrm>
+      </p:grpSpPr>
+      <p:sp>
+        <p:nvSpPr>
+          <p:cNvPr id="2" name="Title 1"/>
+          <p:cNvSpPr>
+            <a:spLocks noGrp="1"/>
+          </p:cNvSpPr>
+          <p:nvPr>
+            <p:ph type="title"/>
+          </p:nvPr>
+        </p:nvSpPr>
+        <p:spPr/>
+        <p:txBody>
           <a:bodyPr/>
           <a:lstStyle/>
           <a:p>
@@ -4884,10 +5064,17 @@
   <p:clrMapOvr>
     <a:masterClrMapping/>
   </p:clrMapOvr>
+  <p:timing>
+    <p:tnLst>
+      <p:par>
+        <p:cTn id="1" dur="indefinite" restart="never" nodeType="tmRoot"/>
+      </p:par>
+    </p:tnLst>
+  </p:timing>
 </p:sld>
 </file>
 
-<file path=ppt/slides/slide14.xml><?xml version="1.0" encoding="utf-8"?>
+<file path=ppt/slides/slide15.xml><?xml version="1.0" encoding="utf-8"?>
 <p:sld xmlns:a="http://schemas.openxmlformats.org/drawingml/2006/main" xmlns:r="http://schemas.openxmlformats.org/officeDocument/2006/relationships" xmlns:p="http://schemas.openxmlformats.org/presentationml/2006/main">
   <p:cSld>
     <p:spTree>
@@ -5588,7 +5775,7 @@
 </p:sld>
 </file>
 
-<file path=ppt/slides/slide15.xml><?xml version="1.0" encoding="utf-8"?>
+<file path=ppt/slides/slide16.xml><?xml version="1.0" encoding="utf-8"?>
 <p:sld xmlns:a="http://schemas.openxmlformats.org/drawingml/2006/main" xmlns:r="http://schemas.openxmlformats.org/officeDocument/2006/relationships" xmlns:p="http://schemas.openxmlformats.org/presentationml/2006/main">
   <p:cSld>
     <p:spTree>
@@ -7045,7 +7232,7 @@
 </p:sld>
 </file>
 
-<file path=ppt/slides/slide16.xml><?xml version="1.0" encoding="utf-8"?>
+<file path=ppt/slides/slide17.xml><?xml version="1.0" encoding="utf-8"?>
 <p:sld xmlns:a="http://schemas.openxmlformats.org/drawingml/2006/main" xmlns:r="http://schemas.openxmlformats.org/officeDocument/2006/relationships" xmlns:p="http://schemas.openxmlformats.org/presentationml/2006/main">
   <p:cSld>
     <p:spTree>
@@ -7922,7 +8109,7 @@
 </p:sld>
 </file>
 
-<file path=ppt/slides/slide17.xml><?xml version="1.0" encoding="utf-8"?>
+<file path=ppt/slides/slide18.xml><?xml version="1.0" encoding="utf-8"?>
 <p:sld xmlns:a="http://schemas.openxmlformats.org/drawingml/2006/main" xmlns:r="http://schemas.openxmlformats.org/officeDocument/2006/relationships" xmlns:p="http://schemas.openxmlformats.org/presentationml/2006/main">
   <p:cSld>
     <p:spTree>
@@ -8748,7 +8935,7 @@
 </p:sld>
 </file>
 
-<file path=ppt/slides/slide18.xml><?xml version="1.0" encoding="utf-8"?>
+<file path=ppt/slides/slide19.xml><?xml version="1.0" encoding="utf-8"?>
 <p:sld xmlns:a="http://schemas.openxmlformats.org/drawingml/2006/main" xmlns:r="http://schemas.openxmlformats.org/officeDocument/2006/relationships" xmlns:p="http://schemas.openxmlformats.org/presentationml/2006/main">
   <p:cSld>
     <p:spTree>
@@ -9161,147 +9348,6 @@
       </p:par>
     </p:tnLst>
   </p:timing>
-</p:sld>
-</file>
-
-<file path=ppt/slides/slide19.xml><?xml version="1.0" encoding="utf-8"?>
-<p:sld xmlns:a="http://schemas.openxmlformats.org/drawingml/2006/main" xmlns:r="http://schemas.openxmlformats.org/officeDocument/2006/relationships" xmlns:p="http://schemas.openxmlformats.org/presentationml/2006/main">
-  <p:cSld>
-    <p:spTree>
-      <p:nvGrpSpPr>
-        <p:cNvPr id="1" name=""/>
-        <p:cNvGrpSpPr/>
-        <p:nvPr/>
-      </p:nvGrpSpPr>
-      <p:grpSpPr>
-        <a:xfrm>
-          <a:off x="0" y="0"/>
-          <a:ext cx="0" cy="0"/>
-          <a:chOff x="0" y="0"/>
-          <a:chExt cx="0" cy="0"/>
-        </a:xfrm>
-      </p:grpSpPr>
-      <p:sp>
-        <p:nvSpPr>
-          <p:cNvPr id="2" name="Title 1"/>
-          <p:cNvSpPr>
-            <a:spLocks noGrp="1"/>
-          </p:cNvSpPr>
-          <p:nvPr>
-            <p:ph type="title"/>
-          </p:nvPr>
-        </p:nvSpPr>
-        <p:spPr/>
-        <p:txBody>
-          <a:bodyPr>
-            <a:normAutofit fontScale="90000"/>
-          </a:bodyPr>
-          <a:lstStyle/>
-          <a:p>
-            <a:r>
-              <a:rPr lang="ru-RU" dirty="0" smtClean="0"/>
-              <a:t>Глобальный кеш сборок</a:t>
-            </a:r>
-            <a:r>
-              <a:rPr lang="en-US" dirty="0" smtClean="0"/>
-              <a:t/>
-            </a:r>
-            <a:br>
-              <a:rPr lang="en-US" dirty="0" smtClean="0"/>
-            </a:br>
-            <a:r>
-              <a:rPr lang="en-US" dirty="0" smtClean="0"/>
-              <a:t>Global Assembly Cache (GAC)</a:t>
-            </a:r>
-            <a:endParaRPr lang="ru-RU" dirty="0"/>
-          </a:p>
-        </p:txBody>
-      </p:sp>
-      <p:sp>
-        <p:nvSpPr>
-          <p:cNvPr id="3" name="Content Placeholder 2"/>
-          <p:cNvSpPr>
-            <a:spLocks noGrp="1"/>
-          </p:cNvSpPr>
-          <p:nvPr>
-            <p:ph idx="1"/>
-          </p:nvPr>
-        </p:nvSpPr>
-        <p:spPr/>
-        <p:txBody>
-          <a:bodyPr/>
-          <a:lstStyle/>
-          <a:p>
-            <a:r>
-              <a:rPr lang="ru-RU" dirty="0" smtClean="0"/>
-              <a:t>Расположение</a:t>
-            </a:r>
-            <a:endParaRPr lang="en-US" dirty="0" smtClean="0"/>
-          </a:p>
-          <a:p>
-            <a:pPr lvl="1"/>
-            <a:r>
-              <a:rPr lang="en-US" dirty="0" smtClean="0"/>
-              <a:t>%</a:t>
-            </a:r>
-            <a:r>
-              <a:rPr lang="en-US" dirty="0" err="1" smtClean="0"/>
-              <a:t>windir</a:t>
-            </a:r>
-            <a:r>
-              <a:rPr lang="en-US" dirty="0" smtClean="0"/>
-              <a:t>%\assembly</a:t>
-            </a:r>
-          </a:p>
-          <a:p>
-            <a:pPr lvl="1"/>
-            <a:r>
-              <a:rPr lang="en-US" dirty="0" smtClean="0"/>
-              <a:t>%</a:t>
-            </a:r>
-            <a:r>
-              <a:rPr lang="en-US" dirty="0" err="1" smtClean="0"/>
-              <a:t>windir</a:t>
-            </a:r>
-            <a:r>
-              <a:rPr lang="en-US" dirty="0" smtClean="0"/>
-              <a:t>%\Microsoft.NET\assembly</a:t>
-            </a:r>
-            <a:r>
-              <a:rPr lang="ru-RU" dirty="0" smtClean="0"/>
-              <a:t> (</a:t>
-            </a:r>
-            <a:r>
-              <a:rPr lang="en-US" dirty="0" smtClean="0"/>
-              <a:t>.NET 4+)</a:t>
-            </a:r>
-          </a:p>
-          <a:p>
-            <a:r>
-              <a:rPr lang="ru-RU" dirty="0" smtClean="0"/>
-              <a:t>Добавление сборки в </a:t>
-            </a:r>
-            <a:r>
-              <a:rPr lang="en-US" smtClean="0"/>
-              <a:t>GAC</a:t>
-            </a:r>
-          </a:p>
-          <a:p>
-            <a:pPr lvl="1"/>
-            <a:endParaRPr lang="ru-RU" dirty="0"/>
-          </a:p>
-        </p:txBody>
-      </p:sp>
-    </p:spTree>
-    <p:extLst>
-      <p:ext uri="{BB962C8B-B14F-4D97-AF65-F5344CB8AC3E}">
-        <p14:creationId xmlns:p14="http://schemas.microsoft.com/office/powerpoint/2010/main" val="1521006786"/>
-      </p:ext>
-    </p:extLst>
-  </p:cSld>
-  <p:clrMapOvr>
-    <a:masterClrMapping/>
-  </p:clrMapOvr>
 </p:sld>
 </file>
 
@@ -9399,6 +9445,154 @@
       </p:grpSpPr>
       <p:sp>
         <p:nvSpPr>
+          <p:cNvPr id="2" name="Title 1"/>
+          <p:cNvSpPr>
+            <a:spLocks noGrp="1"/>
+          </p:cNvSpPr>
+          <p:nvPr>
+            <p:ph type="title"/>
+          </p:nvPr>
+        </p:nvSpPr>
+        <p:spPr/>
+        <p:txBody>
+          <a:bodyPr>
+            <a:normAutofit fontScale="90000"/>
+          </a:bodyPr>
+          <a:lstStyle/>
+          <a:p>
+            <a:r>
+              <a:rPr lang="ru-RU" dirty="0" smtClean="0"/>
+              <a:t>Глобальный кеш сборок</a:t>
+            </a:r>
+            <a:r>
+              <a:rPr lang="en-US" dirty="0" smtClean="0"/>
+              <a:t/>
+            </a:r>
+            <a:br>
+              <a:rPr lang="en-US" dirty="0" smtClean="0"/>
+            </a:br>
+            <a:r>
+              <a:rPr lang="en-US" dirty="0" smtClean="0"/>
+              <a:t>Global Assembly Cache (GAC)</a:t>
+            </a:r>
+            <a:endParaRPr lang="ru-RU" dirty="0"/>
+          </a:p>
+        </p:txBody>
+      </p:sp>
+      <p:sp>
+        <p:nvSpPr>
+          <p:cNvPr id="3" name="Content Placeholder 2"/>
+          <p:cNvSpPr>
+            <a:spLocks noGrp="1"/>
+          </p:cNvSpPr>
+          <p:nvPr>
+            <p:ph idx="1"/>
+          </p:nvPr>
+        </p:nvSpPr>
+        <p:spPr/>
+        <p:txBody>
+          <a:bodyPr/>
+          <a:lstStyle/>
+          <a:p>
+            <a:r>
+              <a:rPr lang="ru-RU" dirty="0" smtClean="0"/>
+              <a:t>Расположение</a:t>
+            </a:r>
+            <a:endParaRPr lang="en-US" dirty="0" smtClean="0"/>
+          </a:p>
+          <a:p>
+            <a:pPr lvl="1"/>
+            <a:r>
+              <a:rPr lang="en-US" dirty="0" smtClean="0"/>
+              <a:t>%</a:t>
+            </a:r>
+            <a:r>
+              <a:rPr lang="en-US" dirty="0" err="1" smtClean="0"/>
+              <a:t>windir</a:t>
+            </a:r>
+            <a:r>
+              <a:rPr lang="en-US" dirty="0" smtClean="0"/>
+              <a:t>%\assembly</a:t>
+            </a:r>
+          </a:p>
+          <a:p>
+            <a:pPr lvl="1"/>
+            <a:r>
+              <a:rPr lang="en-US" dirty="0" smtClean="0"/>
+              <a:t>%</a:t>
+            </a:r>
+            <a:r>
+              <a:rPr lang="en-US" dirty="0" err="1" smtClean="0"/>
+              <a:t>windir</a:t>
+            </a:r>
+            <a:r>
+              <a:rPr lang="en-US" dirty="0" smtClean="0"/>
+              <a:t>%\Microsoft.NET\assembly</a:t>
+            </a:r>
+            <a:r>
+              <a:rPr lang="ru-RU" dirty="0" smtClean="0"/>
+              <a:t> (</a:t>
+            </a:r>
+            <a:r>
+              <a:rPr lang="en-US" dirty="0" smtClean="0"/>
+              <a:t>.NET 4+)</a:t>
+            </a:r>
+          </a:p>
+          <a:p>
+            <a:r>
+              <a:rPr lang="ru-RU" dirty="0" smtClean="0"/>
+              <a:t>Добавление сборки в </a:t>
+            </a:r>
+            <a:r>
+              <a:rPr lang="en-US" smtClean="0"/>
+              <a:t>GAC</a:t>
+            </a:r>
+          </a:p>
+          <a:p>
+            <a:pPr lvl="1"/>
+            <a:endParaRPr lang="ru-RU" dirty="0"/>
+          </a:p>
+        </p:txBody>
+      </p:sp>
+    </p:spTree>
+    <p:extLst>
+      <p:ext uri="{BB962C8B-B14F-4D97-AF65-F5344CB8AC3E}">
+        <p14:creationId xmlns:p14="http://schemas.microsoft.com/office/powerpoint/2010/main" val="1521006786"/>
+      </p:ext>
+    </p:extLst>
+  </p:cSld>
+  <p:clrMapOvr>
+    <a:masterClrMapping/>
+  </p:clrMapOvr>
+  <p:timing>
+    <p:tnLst>
+      <p:par>
+        <p:cTn id="1" dur="indefinite" restart="never" nodeType="tmRoot"/>
+      </p:par>
+    </p:tnLst>
+  </p:timing>
+</p:sld>
+</file>
+
+<file path=ppt/slides/slide21.xml><?xml version="1.0" encoding="utf-8"?>
+<p:sld xmlns:a="http://schemas.openxmlformats.org/drawingml/2006/main" xmlns:r="http://schemas.openxmlformats.org/officeDocument/2006/relationships" xmlns:p="http://schemas.openxmlformats.org/presentationml/2006/main">
+  <p:cSld>
+    <p:spTree>
+      <p:nvGrpSpPr>
+        <p:cNvPr id="1" name=""/>
+        <p:cNvGrpSpPr/>
+        <p:nvPr/>
+      </p:nvGrpSpPr>
+      <p:grpSpPr>
+        <a:xfrm>
+          <a:off x="0" y="0"/>
+          <a:ext cx="0" cy="0"/>
+          <a:chOff x="0" y="0"/>
+          <a:chExt cx="0" cy="0"/>
+        </a:xfrm>
+      </p:grpSpPr>
+      <p:sp>
+        <p:nvSpPr>
           <p:cNvPr id="5122" name="Rectangle 3"/>
           <p:cNvSpPr>
             <a:spLocks noChangeArrowheads="1"/>
@@ -10091,7 +10285,7 @@
 </p:sld>
 </file>
 
-<file path=ppt/slides/slide21.xml><?xml version="1.0" encoding="utf-8"?>
+<file path=ppt/slides/slide22.xml><?xml version="1.0" encoding="utf-8"?>
 <p:sld xmlns:a="http://schemas.openxmlformats.org/drawingml/2006/main" xmlns:r="http://schemas.openxmlformats.org/officeDocument/2006/relationships" xmlns:p="http://schemas.openxmlformats.org/presentationml/2006/main">
   <p:cSld>
     <p:spTree>
@@ -10464,7 +10658,7 @@
 </p:sld>
 </file>
 
-<file path=ppt/slides/slide22.xml><?xml version="1.0" encoding="utf-8"?>
+<file path=ppt/slides/slide23.xml><?xml version="1.0" encoding="utf-8"?>
 <p:sld xmlns:a="http://schemas.openxmlformats.org/drawingml/2006/main" xmlns:r="http://schemas.openxmlformats.org/officeDocument/2006/relationships" xmlns:p="http://schemas.openxmlformats.org/presentationml/2006/main">
   <p:cSld>
     <p:spTree>
@@ -11335,7 +11529,7 @@
 </p:sld>
 </file>
 
-<file path=ppt/slides/slide23.xml><?xml version="1.0" encoding="utf-8"?>
+<file path=ppt/slides/slide24.xml><?xml version="1.0" encoding="utf-8"?>
 <p:sld xmlns:a="http://schemas.openxmlformats.org/drawingml/2006/main" xmlns:r="http://schemas.openxmlformats.org/officeDocument/2006/relationships" xmlns:p="http://schemas.openxmlformats.org/presentationml/2006/main">
   <p:cSld>
     <p:spTree>
@@ -12194,7 +12388,7 @@
 </p:sld>
 </file>
 
-<file path=ppt/slides/slide24.xml><?xml version="1.0" encoding="utf-8"?>
+<file path=ppt/slides/slide25.xml><?xml version="1.0" encoding="utf-8"?>
 <p:sld xmlns:a="http://schemas.openxmlformats.org/drawingml/2006/main" xmlns:r="http://schemas.openxmlformats.org/officeDocument/2006/relationships" xmlns:p="http://schemas.openxmlformats.org/presentationml/2006/main">
   <p:cSld>
     <p:spTree>
@@ -12848,7 +13042,7 @@
 </p:sld>
 </file>
 
-<file path=ppt/slides/slide25.xml><?xml version="1.0" encoding="utf-8"?>
+<file path=ppt/slides/slide26.xml><?xml version="1.0" encoding="utf-8"?>
 <p:sld xmlns:a="http://schemas.openxmlformats.org/drawingml/2006/main" xmlns:r="http://schemas.openxmlformats.org/officeDocument/2006/relationships" xmlns:p="http://schemas.openxmlformats.org/presentationml/2006/main">
   <p:cSld>
     <p:spTree>

</xml_diff>